<commit_message>
Continue to work on constructing a properly failing test case
</commit_message>
<xml_diff>
--- a/test/ShapeCrawler.Tests.Unit.xUnit/Resource/055_svg_with_text.pptx
+++ b/test/ShapeCrawler.Tests.Unit.xUnit/Resource/055_svg_with_text.pptx
@@ -3339,10 +3339,10 @@
       </p:grpSpPr>
       <p:pic>
         <p:nvPicPr>
-          <p:cNvPr id="7" name="Original">
-            <a:extLst>
-              <a:ext uri="{FF2B5EF4-FFF2-40B4-BE49-F238E27FC236}">
-                <a16:creationId xmlns:a16="http://schemas.microsoft.com/office/drawing/2014/main" id="{F4D1534C-B132-6BB5-FD25-0EACB1021991}"/>
+          <p:cNvPr id="3" name="Original">
+            <a:extLst>
+              <a:ext uri="{FF2B5EF4-FFF2-40B4-BE49-F238E27FC236}">
+                <a16:creationId xmlns:a16="http://schemas.microsoft.com/office/drawing/2014/main" id="{EE629BDC-AD4C-AFC8-3DA8-70A948EA8CC8}"/>
               </a:ext>
             </a:extLst>
           </p:cNvPr>
@@ -3368,8 +3368,8 @@
         </p:blipFill>
         <p:spPr>
           <a:xfrm>
-            <a:off x="5667375" y="3000375"/>
-            <a:ext cx="857250" cy="857250"/>
+            <a:off x="5376862" y="2709862"/>
+            <a:ext cx="1438275" cy="1438275"/>
           </a:xfrm>
           <a:prstGeom prst="rect">
             <a:avLst/>

</xml_diff>

<commit_message>
Continuing to try to find a proper failing test
</commit_message>
<xml_diff>
--- a/test/ShapeCrawler.Tests.Unit.xUnit/Resource/055_svg_with_text.pptx
+++ b/test/ShapeCrawler.Tests.Unit.xUnit/Resource/055_svg_with_text.pptx
@@ -3339,10 +3339,10 @@
       </p:grpSpPr>
       <p:pic>
         <p:nvPicPr>
-          <p:cNvPr id="3" name="Original">
-            <a:extLst>
-              <a:ext uri="{FF2B5EF4-FFF2-40B4-BE49-F238E27FC236}">
-                <a16:creationId xmlns:a16="http://schemas.microsoft.com/office/drawing/2014/main" id="{EE629BDC-AD4C-AFC8-3DA8-70A948EA8CC8}"/>
+          <p:cNvPr id="4" name="Original">
+            <a:extLst>
+              <a:ext uri="{FF2B5EF4-FFF2-40B4-BE49-F238E27FC236}">
+                <a16:creationId xmlns:a16="http://schemas.microsoft.com/office/drawing/2014/main" id="{63A1537B-9CCC-646E-0FE0-D7A4534CFA92}"/>
               </a:ext>
             </a:extLst>
           </p:cNvPr>
@@ -3368,8 +3368,8 @@
         </p:blipFill>
         <p:spPr>
           <a:xfrm>
-            <a:off x="5376862" y="2709862"/>
-            <a:ext cx="1438275" cy="1438275"/>
+            <a:off x="5915025" y="3248025"/>
+            <a:ext cx="361950" cy="361950"/>
           </a:xfrm>
           <a:prstGeom prst="rect">
             <a:avLst/>

</xml_diff>

<commit_message>
Fix problems with text in SVG pictures
Fixes #681
</commit_message>
<xml_diff>
--- a/test/ShapeCrawler.Tests.Unit.xUnit/Resource/055_svg_with_text.pptx
+++ b/test/ShapeCrawler.Tests.Unit.xUnit/Resource/055_svg_with_text.pptx
@@ -3339,10 +3339,10 @@
       </p:grpSpPr>
       <p:pic>
         <p:nvPicPr>
-          <p:cNvPr id="4" name="Original">
-            <a:extLst>
-              <a:ext uri="{FF2B5EF4-FFF2-40B4-BE49-F238E27FC236}">
-                <a16:creationId xmlns:a16="http://schemas.microsoft.com/office/drawing/2014/main" id="{63A1537B-9CCC-646E-0FE0-D7A4534CFA92}"/>
+          <p:cNvPr id="3" name="Original">
+            <a:extLst>
+              <a:ext uri="{FF2B5EF4-FFF2-40B4-BE49-F238E27FC236}">
+                <a16:creationId xmlns:a16="http://schemas.microsoft.com/office/drawing/2014/main" id="{4DE24AC5-63D7-1A37-7E37-106B9FDAECF8}"/>
               </a:ext>
             </a:extLst>
           </p:cNvPr>
@@ -3368,8 +3368,8 @@
         </p:blipFill>
         <p:spPr>
           <a:xfrm>
-            <a:off x="5915025" y="3248025"/>
-            <a:ext cx="361950" cy="361950"/>
+            <a:off x="5638800" y="2971800"/>
+            <a:ext cx="914400" cy="914400"/>
           </a:xfrm>
           <a:prstGeom prst="rect">
             <a:avLst/>

</xml_diff>